<commit_message>
README 오타 및 Hierarchy 그림 수정
</commit_message>
<xml_diff>
--- a/ReadMeRes/ImageFactory.pptx
+++ b/ReadMeRes/ImageFactory.pptx
@@ -259,7 +259,7 @@
           <a:p>
             <a:fld id="{1E253523-4079-4E12-A6F2-4B3130B342C7}" type="datetimeFigureOut">
               <a:rPr lang="ko-KR" altLang="en-US" smtClean="0"/>
-              <a:t>2020-09-11</a:t>
+              <a:t>2020-09-14</a:t>
             </a:fld>
             <a:endParaRPr lang="ko-KR" altLang="en-US"/>
           </a:p>
@@ -457,7 +457,7 @@
           <a:p>
             <a:fld id="{1E253523-4079-4E12-A6F2-4B3130B342C7}" type="datetimeFigureOut">
               <a:rPr lang="ko-KR" altLang="en-US" smtClean="0"/>
-              <a:t>2020-09-11</a:t>
+              <a:t>2020-09-14</a:t>
             </a:fld>
             <a:endParaRPr lang="ko-KR" altLang="en-US"/>
           </a:p>
@@ -665,7 +665,7 @@
           <a:p>
             <a:fld id="{1E253523-4079-4E12-A6F2-4B3130B342C7}" type="datetimeFigureOut">
               <a:rPr lang="ko-KR" altLang="en-US" smtClean="0"/>
-              <a:t>2020-09-11</a:t>
+              <a:t>2020-09-14</a:t>
             </a:fld>
             <a:endParaRPr lang="ko-KR" altLang="en-US"/>
           </a:p>
@@ -863,7 +863,7 @@
           <a:p>
             <a:fld id="{1E253523-4079-4E12-A6F2-4B3130B342C7}" type="datetimeFigureOut">
               <a:rPr lang="ko-KR" altLang="en-US" smtClean="0"/>
-              <a:t>2020-09-11</a:t>
+              <a:t>2020-09-14</a:t>
             </a:fld>
             <a:endParaRPr lang="ko-KR" altLang="en-US"/>
           </a:p>
@@ -1138,7 +1138,7 @@
           <a:p>
             <a:fld id="{1E253523-4079-4E12-A6F2-4B3130B342C7}" type="datetimeFigureOut">
               <a:rPr lang="ko-KR" altLang="en-US" smtClean="0"/>
-              <a:t>2020-09-11</a:t>
+              <a:t>2020-09-14</a:t>
             </a:fld>
             <a:endParaRPr lang="ko-KR" altLang="en-US"/>
           </a:p>
@@ -1403,7 +1403,7 @@
           <a:p>
             <a:fld id="{1E253523-4079-4E12-A6F2-4B3130B342C7}" type="datetimeFigureOut">
               <a:rPr lang="ko-KR" altLang="en-US" smtClean="0"/>
-              <a:t>2020-09-11</a:t>
+              <a:t>2020-09-14</a:t>
             </a:fld>
             <a:endParaRPr lang="ko-KR" altLang="en-US"/>
           </a:p>
@@ -1815,7 +1815,7 @@
           <a:p>
             <a:fld id="{1E253523-4079-4E12-A6F2-4B3130B342C7}" type="datetimeFigureOut">
               <a:rPr lang="ko-KR" altLang="en-US" smtClean="0"/>
-              <a:t>2020-09-11</a:t>
+              <a:t>2020-09-14</a:t>
             </a:fld>
             <a:endParaRPr lang="ko-KR" altLang="en-US"/>
           </a:p>
@@ -1956,7 +1956,7 @@
           <a:p>
             <a:fld id="{1E253523-4079-4E12-A6F2-4B3130B342C7}" type="datetimeFigureOut">
               <a:rPr lang="ko-KR" altLang="en-US" smtClean="0"/>
-              <a:t>2020-09-11</a:t>
+              <a:t>2020-09-14</a:t>
             </a:fld>
             <a:endParaRPr lang="ko-KR" altLang="en-US"/>
           </a:p>
@@ -2069,7 +2069,7 @@
           <a:p>
             <a:fld id="{1E253523-4079-4E12-A6F2-4B3130B342C7}" type="datetimeFigureOut">
               <a:rPr lang="ko-KR" altLang="en-US" smtClean="0"/>
-              <a:t>2020-09-11</a:t>
+              <a:t>2020-09-14</a:t>
             </a:fld>
             <a:endParaRPr lang="ko-KR" altLang="en-US"/>
           </a:p>
@@ -2380,7 +2380,7 @@
           <a:p>
             <a:fld id="{1E253523-4079-4E12-A6F2-4B3130B342C7}" type="datetimeFigureOut">
               <a:rPr lang="ko-KR" altLang="en-US" smtClean="0"/>
-              <a:t>2020-09-11</a:t>
+              <a:t>2020-09-14</a:t>
             </a:fld>
             <a:endParaRPr lang="ko-KR" altLang="en-US"/>
           </a:p>
@@ -2668,7 +2668,7 @@
           <a:p>
             <a:fld id="{1E253523-4079-4E12-A6F2-4B3130B342C7}" type="datetimeFigureOut">
               <a:rPr lang="ko-KR" altLang="en-US" smtClean="0"/>
-              <a:t>2020-09-11</a:t>
+              <a:t>2020-09-14</a:t>
             </a:fld>
             <a:endParaRPr lang="ko-KR" altLang="en-US"/>
           </a:p>
@@ -2909,7 +2909,7 @@
           <a:p>
             <a:fld id="{1E253523-4079-4E12-A6F2-4B3130B342C7}" type="datetimeFigureOut">
               <a:rPr lang="ko-KR" altLang="en-US" smtClean="0"/>
-              <a:t>2020-09-11</a:t>
+              <a:t>2020-09-14</a:t>
             </a:fld>
             <a:endParaRPr lang="ko-KR" altLang="en-US"/>
           </a:p>
@@ -5214,7 +5214,7 @@
         </p:nvSpPr>
         <p:spPr>
           <a:xfrm>
-            <a:off x="5570250" y="201320"/>
+            <a:off x="5578343" y="201320"/>
             <a:ext cx="2089149" cy="361760"/>
           </a:xfrm>
           <a:prstGeom prst="roundRect">
@@ -5280,7 +5280,7 @@
         </p:nvSpPr>
         <p:spPr>
           <a:xfrm>
-            <a:off x="5576347" y="1260149"/>
+            <a:off x="5578343" y="1260149"/>
             <a:ext cx="2089149" cy="361760"/>
           </a:xfrm>
           <a:prstGeom prst="roundRect">
@@ -5294,14 +5294,14 @@
           <a:lnRef idx="1">
             <a:schemeClr val="accent5"/>
           </a:lnRef>
-          <a:fillRef idx="2">
+          <a:fillRef idx="3">
             <a:schemeClr val="accent5"/>
           </a:fillRef>
-          <a:effectRef idx="1">
+          <a:effectRef idx="2">
             <a:schemeClr val="accent5"/>
           </a:effectRef>
           <a:fontRef idx="minor">
-            <a:schemeClr val="dk1"/>
+            <a:schemeClr val="lt1"/>
           </a:fontRef>
         </p:style>
         <p:txBody>
@@ -5312,7 +5312,7 @@
             <a:r>
               <a:rPr lang="en-US" altLang="ko-KR" sz="1600" b="1" dirty="0" err="1">
                 <a:solidFill>
-                  <a:schemeClr val="tx1"/>
+                  <a:schemeClr val="bg1"/>
                 </a:solidFill>
                 <a:latin typeface="Times New Roman" panose="02020603050405020304" pitchFamily="18" charset="0"/>
                 <a:cs typeface="Times New Roman" panose="02020603050405020304" pitchFamily="18" charset="0"/>
@@ -5321,7 +5321,7 @@
             </a:r>
             <a:endParaRPr lang="ko-KR" altLang="en-US" sz="1600" b="1" dirty="0">
               <a:solidFill>
-                <a:schemeClr val="tx1"/>
+                <a:schemeClr val="bg1"/>
               </a:solidFill>
               <a:latin typeface="Times New Roman" panose="02020603050405020304" pitchFamily="18" charset="0"/>
               <a:cs typeface="Times New Roman" panose="02020603050405020304" pitchFamily="18" charset="0"/>
@@ -5346,9 +5346,9 @@
           <p:nvPr/>
         </p:nvCxnSpPr>
         <p:spPr>
-          <a:xfrm flipH="1" flipV="1">
-            <a:off x="6614825" y="563080"/>
-            <a:ext cx="6097" cy="697069"/>
+          <a:xfrm flipV="1">
+            <a:off x="6622918" y="563080"/>
+            <a:ext cx="0" cy="697069"/>
           </a:xfrm>
           <a:prstGeom prst="straightConnector1">
             <a:avLst/>
@@ -5515,8 +5515,8 @@
         </p:nvCxnSpPr>
         <p:spPr>
           <a:xfrm rot="5400000" flipH="1" flipV="1">
-            <a:off x="3285582" y="-71540"/>
-            <a:ext cx="778195" cy="3803335"/>
+            <a:off x="3286580" y="-72538"/>
+            <a:ext cx="778195" cy="3805331"/>
           </a:xfrm>
           <a:prstGeom prst="bentConnector2">
             <a:avLst/>
@@ -5558,8 +5558,8 @@
         </p:nvCxnSpPr>
         <p:spPr>
           <a:xfrm rot="5400000" flipH="1" flipV="1">
-            <a:off x="4502965" y="1145842"/>
-            <a:ext cx="778195" cy="1368570"/>
+            <a:off x="4503963" y="1144844"/>
+            <a:ext cx="778195" cy="1370566"/>
           </a:xfrm>
           <a:prstGeom prst="bentConnector2">
             <a:avLst/>
@@ -6052,7 +6052,7 @@
         </p:nvSpPr>
         <p:spPr>
           <a:xfrm>
-            <a:off x="5576347" y="2167318"/>
+            <a:off x="5578343" y="2167318"/>
             <a:ext cx="2089149" cy="361760"/>
           </a:xfrm>
           <a:prstGeom prst="roundRect">
@@ -6066,14 +6066,14 @@
           </a:ln>
         </p:spPr>
         <p:style>
-          <a:lnRef idx="0">
-            <a:schemeClr val="accent4"/>
+          <a:lnRef idx="1">
+            <a:schemeClr val="accent5"/>
           </a:lnRef>
           <a:fillRef idx="3">
-            <a:schemeClr val="accent4"/>
+            <a:schemeClr val="accent5"/>
           </a:fillRef>
-          <a:effectRef idx="3">
-            <a:schemeClr val="accent4"/>
+          <a:effectRef idx="2">
+            <a:schemeClr val="accent5"/>
           </a:effectRef>
           <a:fontRef idx="minor">
             <a:schemeClr val="lt1"/>
@@ -6104,49 +6104,6 @@
           </a:p>
         </p:txBody>
       </p:sp>
-      <p:cxnSp>
-        <p:nvCxnSpPr>
-          <p:cNvPr id="136" name="직선 화살표 연결선 135">
-            <a:extLst>
-              <a:ext uri="{FF2B5EF4-FFF2-40B4-BE49-F238E27FC236}">
-                <a16:creationId xmlns:a16="http://schemas.microsoft.com/office/drawing/2014/main" id="{FB9BFBCC-2212-4DC1-B22A-9D11EB9D8E44}"/>
-              </a:ext>
-            </a:extLst>
-          </p:cNvPr>
-          <p:cNvCxnSpPr>
-            <a:cxnSpLocks/>
-            <a:stCxn id="1028" idx="0"/>
-            <a:endCxn id="74" idx="2"/>
-          </p:cNvCxnSpPr>
-          <p:nvPr/>
-        </p:nvCxnSpPr>
-        <p:spPr>
-          <a:xfrm flipV="1">
-            <a:off x="6620922" y="1621909"/>
-            <a:ext cx="0" cy="545409"/>
-          </a:xfrm>
-          <a:prstGeom prst="straightConnector1">
-            <a:avLst/>
-          </a:prstGeom>
-          <a:ln w="19050">
-            <a:tailEnd type="triangle"/>
-          </a:ln>
-        </p:spPr>
-        <p:style>
-          <a:lnRef idx="1">
-            <a:schemeClr val="accent2"/>
-          </a:lnRef>
-          <a:fillRef idx="0">
-            <a:schemeClr val="accent2"/>
-          </a:fillRef>
-          <a:effectRef idx="0">
-            <a:schemeClr val="accent2"/>
-          </a:effectRef>
-          <a:fontRef idx="minor">
-            <a:schemeClr val="tx1"/>
-          </a:fontRef>
-        </p:style>
-      </p:cxnSp>
       <p:sp>
         <p:nvSpPr>
           <p:cNvPr id="1034" name="사각형: 둥근 모서리 1033">
@@ -6161,7 +6118,7 @@
         </p:nvSpPr>
         <p:spPr>
           <a:xfrm>
-            <a:off x="5586435" y="3178298"/>
+            <a:off x="5578343" y="3178298"/>
             <a:ext cx="2089149" cy="361760"/>
           </a:xfrm>
           <a:prstGeom prst="roundRect">
@@ -6273,92 +6230,6 @@
           </a:p>
         </p:txBody>
       </p:sp>
-      <p:cxnSp>
-        <p:nvCxnSpPr>
-          <p:cNvPr id="148" name="직선 화살표 연결선 147">
-            <a:extLst>
-              <a:ext uri="{FF2B5EF4-FFF2-40B4-BE49-F238E27FC236}">
-                <a16:creationId xmlns:a16="http://schemas.microsoft.com/office/drawing/2014/main" id="{D812F85C-D8E8-436C-BB84-788675B256AA}"/>
-              </a:ext>
-            </a:extLst>
-          </p:cNvPr>
-          <p:cNvCxnSpPr>
-            <a:cxnSpLocks/>
-            <a:stCxn id="1034" idx="0"/>
-            <a:endCxn id="1028" idx="2"/>
-          </p:cNvCxnSpPr>
-          <p:nvPr/>
-        </p:nvCxnSpPr>
-        <p:spPr>
-          <a:xfrm flipH="1" flipV="1">
-            <a:off x="6620922" y="2529078"/>
-            <a:ext cx="10088" cy="649220"/>
-          </a:xfrm>
-          <a:prstGeom prst="straightConnector1">
-            <a:avLst/>
-          </a:prstGeom>
-          <a:ln w="19050">
-            <a:tailEnd type="triangle"/>
-          </a:ln>
-        </p:spPr>
-        <p:style>
-          <a:lnRef idx="1">
-            <a:schemeClr val="accent5"/>
-          </a:lnRef>
-          <a:fillRef idx="0">
-            <a:schemeClr val="accent5"/>
-          </a:fillRef>
-          <a:effectRef idx="0">
-            <a:schemeClr val="accent5"/>
-          </a:effectRef>
-          <a:fontRef idx="minor">
-            <a:schemeClr val="tx1"/>
-          </a:fontRef>
-        </p:style>
-      </p:cxnSp>
-      <p:cxnSp>
-        <p:nvCxnSpPr>
-          <p:cNvPr id="152" name="연결선: 꺾임 151">
-            <a:extLst>
-              <a:ext uri="{FF2B5EF4-FFF2-40B4-BE49-F238E27FC236}">
-                <a16:creationId xmlns:a16="http://schemas.microsoft.com/office/drawing/2014/main" id="{F7881627-DF4C-4FFD-8738-8B30E1DFA91F}"/>
-              </a:ext>
-            </a:extLst>
-          </p:cNvPr>
-          <p:cNvCxnSpPr>
-            <a:cxnSpLocks/>
-            <a:stCxn id="147" idx="0"/>
-            <a:endCxn id="1028" idx="3"/>
-          </p:cNvCxnSpPr>
-          <p:nvPr/>
-        </p:nvCxnSpPr>
-        <p:spPr>
-          <a:xfrm rot="16200000" flipV="1">
-            <a:off x="6977613" y="3036082"/>
-            <a:ext cx="2747835" cy="1372068"/>
-          </a:xfrm>
-          <a:prstGeom prst="bentConnector2">
-            <a:avLst/>
-          </a:prstGeom>
-          <a:ln w="19050">
-            <a:tailEnd type="triangle"/>
-          </a:ln>
-        </p:spPr>
-        <p:style>
-          <a:lnRef idx="3">
-            <a:schemeClr val="accent5"/>
-          </a:lnRef>
-          <a:fillRef idx="0">
-            <a:schemeClr val="accent5"/>
-          </a:fillRef>
-          <a:effectRef idx="2">
-            <a:schemeClr val="accent5"/>
-          </a:effectRef>
-          <a:fontRef idx="minor">
-            <a:schemeClr val="tx1"/>
-          </a:fontRef>
-        </p:style>
-      </p:cxnSp>
       <p:sp>
         <p:nvSpPr>
           <p:cNvPr id="157" name="사각형: 둥근 모서리 156">
@@ -6503,12 +6374,12 @@
         </p:nvCxnSpPr>
         <p:spPr>
           <a:xfrm rot="5400000" flipH="1" flipV="1">
-            <a:off x="4641198" y="3106637"/>
-            <a:ext cx="1556390" cy="2423233"/>
+            <a:off x="4637152" y="3110683"/>
+            <a:ext cx="1556390" cy="2415141"/>
           </a:xfrm>
           <a:prstGeom prst="bentConnector3">
             <a:avLst>
-              <a:gd name="adj1" fmla="val 42656"/>
+              <a:gd name="adj1" fmla="val 40698"/>
             </a:avLst>
           </a:prstGeom>
           <a:ln>
@@ -6549,7 +6420,7 @@
         <p:spPr>
           <a:xfrm flipV="1">
             <a:off x="6622671" y="3540058"/>
-            <a:ext cx="8339" cy="1556390"/>
+            <a:ext cx="247" cy="1556390"/>
           </a:xfrm>
           <a:prstGeom prst="straightConnector1">
             <a:avLst/>
@@ -6891,6 +6762,135 @@
           </a:fillRef>
           <a:effectRef idx="0">
             <a:schemeClr val="accent6"/>
+          </a:effectRef>
+          <a:fontRef idx="minor">
+            <a:schemeClr val="tx1"/>
+          </a:fontRef>
+        </p:style>
+      </p:cxnSp>
+      <p:cxnSp>
+        <p:nvCxnSpPr>
+          <p:cNvPr id="79" name="직선 화살표 연결선 78">
+            <a:extLst>
+              <a:ext uri="{FF2B5EF4-FFF2-40B4-BE49-F238E27FC236}">
+                <a16:creationId xmlns:a16="http://schemas.microsoft.com/office/drawing/2014/main" id="{20F8D044-1338-482A-A223-0A23F9760141}"/>
+              </a:ext>
+            </a:extLst>
+          </p:cNvPr>
+          <p:cNvCxnSpPr>
+            <a:cxnSpLocks/>
+            <a:stCxn id="1034" idx="0"/>
+            <a:endCxn id="1028" idx="2"/>
+          </p:cNvCxnSpPr>
+          <p:nvPr/>
+        </p:nvCxnSpPr>
+        <p:spPr>
+          <a:xfrm flipV="1">
+            <a:off x="6622918" y="2529078"/>
+            <a:ext cx="0" cy="649220"/>
+          </a:xfrm>
+          <a:prstGeom prst="straightConnector1">
+            <a:avLst/>
+          </a:prstGeom>
+          <a:ln w="19050">
+            <a:tailEnd type="triangle"/>
+          </a:ln>
+        </p:spPr>
+        <p:style>
+          <a:lnRef idx="1">
+            <a:schemeClr val="accent2"/>
+          </a:lnRef>
+          <a:fillRef idx="0">
+            <a:schemeClr val="accent2"/>
+          </a:fillRef>
+          <a:effectRef idx="0">
+            <a:schemeClr val="accent2"/>
+          </a:effectRef>
+          <a:fontRef idx="minor">
+            <a:schemeClr val="tx1"/>
+          </a:fontRef>
+        </p:style>
+      </p:cxnSp>
+      <p:cxnSp>
+        <p:nvCxnSpPr>
+          <p:cNvPr id="82" name="직선 화살표 연결선 81">
+            <a:extLst>
+              <a:ext uri="{FF2B5EF4-FFF2-40B4-BE49-F238E27FC236}">
+                <a16:creationId xmlns:a16="http://schemas.microsoft.com/office/drawing/2014/main" id="{15D4D880-F340-4A4D-B7BE-1F777676342C}"/>
+              </a:ext>
+            </a:extLst>
+          </p:cNvPr>
+          <p:cNvCxnSpPr>
+            <a:cxnSpLocks/>
+            <a:stCxn id="1028" idx="0"/>
+            <a:endCxn id="74" idx="2"/>
+          </p:cNvCxnSpPr>
+          <p:nvPr/>
+        </p:nvCxnSpPr>
+        <p:spPr>
+          <a:xfrm flipV="1">
+            <a:off x="6622918" y="1621909"/>
+            <a:ext cx="0" cy="545409"/>
+          </a:xfrm>
+          <a:prstGeom prst="straightConnector1">
+            <a:avLst/>
+          </a:prstGeom>
+          <a:ln w="19050">
+            <a:tailEnd type="triangle"/>
+          </a:ln>
+        </p:spPr>
+        <p:style>
+          <a:lnRef idx="1">
+            <a:schemeClr val="accent2"/>
+          </a:lnRef>
+          <a:fillRef idx="0">
+            <a:schemeClr val="accent2"/>
+          </a:fillRef>
+          <a:effectRef idx="0">
+            <a:schemeClr val="accent2"/>
+          </a:effectRef>
+          <a:fontRef idx="minor">
+            <a:schemeClr val="tx1"/>
+          </a:fontRef>
+        </p:style>
+      </p:cxnSp>
+      <p:cxnSp>
+        <p:nvCxnSpPr>
+          <p:cNvPr id="87" name="연결선: 꺾임 86">
+            <a:extLst>
+              <a:ext uri="{FF2B5EF4-FFF2-40B4-BE49-F238E27FC236}">
+                <a16:creationId xmlns:a16="http://schemas.microsoft.com/office/drawing/2014/main" id="{3CDD224F-AFD3-4897-85BF-45B9D036FDBB}"/>
+              </a:ext>
+            </a:extLst>
+          </p:cNvPr>
+          <p:cNvCxnSpPr>
+            <a:cxnSpLocks/>
+            <a:stCxn id="147" idx="0"/>
+            <a:endCxn id="1028" idx="3"/>
+          </p:cNvCxnSpPr>
+          <p:nvPr/>
+        </p:nvCxnSpPr>
+        <p:spPr>
+          <a:xfrm rot="16200000" flipV="1">
+            <a:off x="6978611" y="3037080"/>
+            <a:ext cx="2747835" cy="1370072"/>
+          </a:xfrm>
+          <a:prstGeom prst="bentConnector2">
+            <a:avLst/>
+          </a:prstGeom>
+          <a:ln>
+            <a:tailEnd type="triangle"/>
+          </a:ln>
+        </p:spPr>
+        <p:style>
+          <a:lnRef idx="3">
+            <a:schemeClr val="accent2"/>
+          </a:lnRef>
+          <a:fillRef idx="0">
+            <a:schemeClr val="accent2"/>
+          </a:fillRef>
+          <a:effectRef idx="2">
+            <a:schemeClr val="accent2"/>
           </a:effectRef>
           <a:fontRef idx="minor">
             <a:schemeClr val="tx1"/>

</xml_diff>